<commit_message>
added: "Q&A", updates on "Next Steps" and "Abbreviations, References" slides
</commit_message>
<xml_diff>
--- a/presentations/ietf114-anima-jws-voucher.pptx
+++ b/presentations/ietf114-anima-jws-voucher.pptx
@@ -5,7 +5,7 @@
     <p:sldMasterId id="2147483663" r:id="rId1"/>
   </p:sldMasterIdLst>
   <p:notesMasterIdLst>
-    <p:notesMasterId r:id="rId9"/>
+    <p:notesMasterId r:id="rId10"/>
   </p:notesMasterIdLst>
   <p:sldIdLst>
     <p:sldId id="256" r:id="rId2"/>
@@ -15,6 +15,7 @@
     <p:sldId id="301" r:id="rId6"/>
     <p:sldId id="285" r:id="rId7"/>
     <p:sldId id="303" r:id="rId8"/>
+    <p:sldId id="305" r:id="rId9"/>
   </p:sldIdLst>
   <p:sldSz cx="12192000" cy="6858000"/>
   <p:notesSz cx="6858000" cy="9144000"/>
@@ -240,7 +241,7 @@
           <a:p>
             <a:fld id="{33B5B5E8-CA78-4A82-83A0-867EF5A818AE}" type="datetimeFigureOut">
               <a:rPr lang="en-US" smtClean="0"/>
-              <a:t>7/8/2022</a:t>
+              <a:t>7/12/2022</a:t>
             </a:fld>
             <a:endParaRPr lang="en-US"/>
           </a:p>
@@ -1011,6 +1012,90 @@
 </p:notes>
 </file>
 
+<file path=ppt/notesSlides/notesSlide7.xml><?xml version="1.0" encoding="utf-8"?>
+<p:notes xmlns:a="http://schemas.openxmlformats.org/drawingml/2006/main" xmlns:r="http://schemas.openxmlformats.org/officeDocument/2006/relationships" xmlns:p="http://schemas.openxmlformats.org/presentationml/2006/main">
+  <p:cSld>
+    <p:spTree>
+      <p:nvGrpSpPr>
+        <p:cNvPr id="1" name=""/>
+        <p:cNvGrpSpPr/>
+        <p:nvPr/>
+      </p:nvGrpSpPr>
+      <p:grpSpPr>
+        <a:xfrm>
+          <a:off x="0" y="0"/>
+          <a:ext cx="0" cy="0"/>
+          <a:chOff x="0" y="0"/>
+          <a:chExt cx="0" cy="0"/>
+        </a:xfrm>
+      </p:grpSpPr>
+      <p:sp>
+        <p:nvSpPr>
+          <p:cNvPr id="2" name="Slide Image Placeholder 1"/>
+          <p:cNvSpPr>
+            <a:spLocks noGrp="1" noRot="1" noChangeAspect="1"/>
+          </p:cNvSpPr>
+          <p:nvPr>
+            <p:ph type="sldImg"/>
+          </p:nvPr>
+        </p:nvSpPr>
+        <p:spPr/>
+      </p:sp>
+      <p:sp>
+        <p:nvSpPr>
+          <p:cNvPr id="3" name="Notes Placeholder 2"/>
+          <p:cNvSpPr>
+            <a:spLocks noGrp="1"/>
+          </p:cNvSpPr>
+          <p:nvPr>
+            <p:ph type="body" idx="1"/>
+          </p:nvPr>
+        </p:nvSpPr>
+        <p:spPr/>
+        <p:txBody>
+          <a:bodyPr/>
+          <a:lstStyle/>
+          <a:p>
+            <a:endParaRPr lang="en-US" dirty="0"/>
+          </a:p>
+        </p:txBody>
+      </p:sp>
+      <p:sp>
+        <p:nvSpPr>
+          <p:cNvPr id="4" name="Slide Number Placeholder 3"/>
+          <p:cNvSpPr>
+            <a:spLocks noGrp="1"/>
+          </p:cNvSpPr>
+          <p:nvPr>
+            <p:ph type="sldNum" sz="quarter" idx="5"/>
+          </p:nvPr>
+        </p:nvSpPr>
+        <p:spPr/>
+        <p:txBody>
+          <a:bodyPr/>
+          <a:lstStyle/>
+          <a:p>
+            <a:fld id="{4C6D392E-C4EF-4AC5-9CF0-E17168E17BBE}" type="slidenum">
+              <a:rPr lang="en-US" smtClean="0"/>
+              <a:t>8</a:t>
+            </a:fld>
+            <a:endParaRPr lang="en-US"/>
+          </a:p>
+        </p:txBody>
+      </p:sp>
+    </p:spTree>
+    <p:extLst>
+      <p:ext uri="{BB962C8B-B14F-4D97-AF65-F5344CB8AC3E}">
+        <p14:creationId xmlns:p14="http://schemas.microsoft.com/office/powerpoint/2010/main" val="3275492216"/>
+      </p:ext>
+    </p:extLst>
+  </p:cSld>
+  <p:clrMapOvr>
+    <a:masterClrMapping/>
+  </p:clrMapOvr>
+</p:notes>
+</file>
+
 <file path=ppt/slideLayouts/slideLayout1.xml><?xml version="1.0" encoding="utf-8"?>
 <p:sldLayout xmlns:a="http://schemas.openxmlformats.org/drawingml/2006/main" xmlns:r="http://schemas.openxmlformats.org/officeDocument/2006/relationships" xmlns:p="http://schemas.openxmlformats.org/presentationml/2006/main" type="title" preserve="1">
   <p:cSld name="Title Slide">
@@ -1166,7 +1251,7 @@
           <a:p>
             <a:fld id="{8C792E63-5F21-4F54-A864-D84D9F273FCA}" type="datetimeFigureOut">
               <a:rPr lang="en-US" smtClean="0"/>
-              <a:t>7/8/2022</a:t>
+              <a:t>7/12/2022</a:t>
             </a:fld>
             <a:endParaRPr lang="en-US" dirty="0"/>
           </a:p>
@@ -1384,7 +1469,7 @@
           <a:p>
             <a:fld id="{8C792E63-5F21-4F54-A864-D84D9F273FCA}" type="datetimeFigureOut">
               <a:rPr lang="en-US" smtClean="0"/>
-              <a:t>7/8/2022</a:t>
+              <a:t>7/12/2022</a:t>
             </a:fld>
             <a:endParaRPr lang="en-US"/>
           </a:p>
@@ -1608,7 +1693,7 @@
           <a:p>
             <a:fld id="{8C792E63-5F21-4F54-A864-D84D9F273FCA}" type="datetimeFigureOut">
               <a:rPr lang="en-US" smtClean="0"/>
-              <a:t>7/8/2022</a:t>
+              <a:t>7/12/2022</a:t>
             </a:fld>
             <a:endParaRPr lang="en-US"/>
           </a:p>
@@ -1822,7 +1907,7 @@
           <a:p>
             <a:fld id="{8C792E63-5F21-4F54-A864-D84D9F273FCA}" type="datetimeFigureOut">
               <a:rPr lang="en-US" smtClean="0"/>
-              <a:t>7/8/2022</a:t>
+              <a:t>7/12/2022</a:t>
             </a:fld>
             <a:endParaRPr lang="en-US"/>
           </a:p>
@@ -2113,7 +2198,7 @@
           <a:p>
             <a:fld id="{8C792E63-5F21-4F54-A864-D84D9F273FCA}" type="datetimeFigureOut">
               <a:rPr lang="en-US" smtClean="0"/>
-              <a:t>7/8/2022</a:t>
+              <a:t>7/12/2022</a:t>
             </a:fld>
             <a:endParaRPr lang="en-US"/>
           </a:p>
@@ -2394,7 +2479,7 @@
           <a:p>
             <a:fld id="{8C792E63-5F21-4F54-A864-D84D9F273FCA}" type="datetimeFigureOut">
               <a:rPr lang="en-US" smtClean="0"/>
-              <a:t>7/8/2022</a:t>
+              <a:t>7/12/2022</a:t>
             </a:fld>
             <a:endParaRPr lang="en-US"/>
           </a:p>
@@ -2822,7 +2907,7 @@
           <a:p>
             <a:fld id="{8C792E63-5F21-4F54-A864-D84D9F273FCA}" type="datetimeFigureOut">
               <a:rPr lang="en-US" smtClean="0"/>
-              <a:t>7/8/2022</a:t>
+              <a:t>7/12/2022</a:t>
             </a:fld>
             <a:endParaRPr lang="en-US"/>
           </a:p>
@@ -2979,7 +3064,7 @@
           <a:p>
             <a:fld id="{8C792E63-5F21-4F54-A864-D84D9F273FCA}" type="datetimeFigureOut">
               <a:rPr lang="en-US" smtClean="0"/>
-              <a:t>7/8/2022</a:t>
+              <a:t>7/12/2022</a:t>
             </a:fld>
             <a:endParaRPr lang="en-US"/>
           </a:p>
@@ -3108,7 +3193,7 @@
           <a:p>
             <a:fld id="{8C792E63-5F21-4F54-A864-D84D9F273FCA}" type="datetimeFigureOut">
               <a:rPr lang="en-US" smtClean="0"/>
-              <a:t>7/8/2022</a:t>
+              <a:t>7/12/2022</a:t>
             </a:fld>
             <a:endParaRPr lang="en-US"/>
           </a:p>
@@ -3435,7 +3520,7 @@
           <a:p>
             <a:fld id="{8C792E63-5F21-4F54-A864-D84D9F273FCA}" type="datetimeFigureOut">
               <a:rPr lang="en-US" smtClean="0"/>
-              <a:t>7/8/2022</a:t>
+              <a:t>7/12/2022</a:t>
             </a:fld>
             <a:endParaRPr lang="en-US"/>
           </a:p>
@@ -3739,7 +3824,7 @@
           <a:p>
             <a:fld id="{8C792E63-5F21-4F54-A864-D84D9F273FCA}" type="datetimeFigureOut">
               <a:rPr lang="en-US" smtClean="0"/>
-              <a:t>7/8/2022</a:t>
+              <a:t>7/12/2022</a:t>
             </a:fld>
             <a:endParaRPr lang="en-US"/>
           </a:p>
@@ -4031,7 +4116,7 @@
           <a:p>
             <a:fld id="{8C792E63-5F21-4F54-A864-D84D9F273FCA}" type="datetimeFigureOut">
               <a:rPr lang="en-US" smtClean="0"/>
-              <a:t>7/8/2022</a:t>
+              <a:t>7/12/2022</a:t>
             </a:fld>
             <a:endParaRPr lang="en-US"/>
           </a:p>
@@ -4471,9 +4556,15 @@
         </p:spPr>
         <p:txBody>
           <a:bodyPr>
-            <a:normAutofit/>
+            <a:normAutofit lnSpcReduction="10000"/>
           </a:bodyPr>
           <a:lstStyle/>
+          <a:p>
+            <a:r>
+              <a:rPr lang="en-US" sz="2800" dirty="0"/>
+              <a:t>JWS signed Voucher Artifacts for Bootstrapping Protocols</a:t>
+            </a:r>
+          </a:p>
           <a:p>
             <a:r>
               <a:rPr lang="en-US" sz="2800" dirty="0"/>
@@ -4811,7 +4902,7 @@
             <a:fld id="{8C792E63-5F21-4F54-A864-D84D9F273FCA}" type="datetimeFigureOut">
               <a:rPr lang="en-US" smtClean="0"/>
               <a:pPr/>
-              <a:t>7/8/2022</a:t>
+              <a:t>7/12/2022</a:t>
             </a:fld>
             <a:endParaRPr lang="en-US"/>
           </a:p>
@@ -4963,8 +5054,8 @@
         </p:nvSpPr>
         <p:spPr>
           <a:xfrm>
-            <a:off x="5669281" y="5419894"/>
-            <a:ext cx="6017623" cy="1169551"/>
+            <a:off x="4874699" y="5419894"/>
+            <a:ext cx="6812206" cy="1169551"/>
           </a:xfrm>
           <a:prstGeom prst="rect">
             <a:avLst/>
@@ -4985,27 +5076,11 @@
           <a:p>
             <a:r>
               <a:rPr lang="en-US" sz="1400" dirty="0"/>
-              <a:t>BRSKI-PRM: BRSKI with Pledge in Responder Mode (draft-</a:t>
-            </a:r>
-            <a:r>
-              <a:rPr lang="en-US" sz="1400" dirty="0" err="1"/>
-              <a:t>ietf</a:t>
-            </a:r>
-            <a:r>
-              <a:rPr lang="en-US" sz="1400" dirty="0"/>
-              <a:t>-anima-</a:t>
-            </a:r>
-            <a:r>
-              <a:rPr lang="en-US" sz="1400" dirty="0" err="1"/>
-              <a:t>brski</a:t>
-            </a:r>
-            <a:r>
-              <a:rPr lang="en-US" sz="1400" dirty="0"/>
-              <a:t>-</a:t>
-            </a:r>
-            <a:r>
-              <a:rPr lang="en-US" sz="1400" dirty="0" err="1"/>
-              <a:t>prm</a:t>
+              <a:t>BRSKI-PRM: BRSKI with Pledge in Responder Mode (</a:t>
+            </a:r>
+            <a:r>
+              <a:rPr lang="en-US" sz="1400" noProof="1"/>
+              <a:t>draft-ietf-anima-brski-prm</a:t>
             </a:r>
             <a:r>
               <a:rPr lang="en-US" sz="1400" dirty="0"/>
@@ -5027,7 +5102,7 @@
           <a:p>
             <a:r>
               <a:rPr lang="en-US" sz="1400" dirty="0"/>
-              <a:t>Voucher: A Voucher Artifact for Bootstrapping Protocols (RFC 8366)</a:t>
+              <a:t>Voucher (CMS-signed JSON ): A Voucher Artifact for Bootstrapping Protocols (RFC 8366)</a:t>
             </a:r>
           </a:p>
         </p:txBody>
@@ -5192,17 +5267,13 @@
             </a:pPr>
             <a:r>
               <a:rPr lang="en-US" sz="1800" dirty="0"/>
-              <a:t>CBOR-in-COSE_Sign	- draft-</a:t>
-            </a:r>
-            <a:r>
-              <a:rPr lang="en-US" sz="1800" dirty="0" err="1"/>
-              <a:t>ietf</a:t>
-            </a:r>
-            <a:r>
-              <a:rPr lang="en-US" sz="1800" dirty="0"/>
-              <a:t>-anima-constrained-voucher</a:t>
-            </a:r>
-            <a:endParaRPr lang="en-US" sz="1400" dirty="0"/>
+              <a:t>CBOR-in-COSE_Sign	- </a:t>
+            </a:r>
+            <a:r>
+              <a:rPr lang="en-US" sz="1800" noProof="1"/>
+              <a:t>draft-ietf-anima-constrained-voucher</a:t>
+            </a:r>
+            <a:endParaRPr lang="en-US" sz="1400" noProof="1"/>
           </a:p>
           <a:p>
             <a:pPr lvl="1">
@@ -5212,23 +5283,11 @@
             </a:pPr>
             <a:r>
               <a:rPr lang="en-US" sz="1800" dirty="0"/>
-              <a:t>Voucher in JSON-in-JWS	- draft-</a:t>
-            </a:r>
-            <a:r>
-              <a:rPr lang="en-US" sz="1800" dirty="0" err="1"/>
-              <a:t>ietf</a:t>
-            </a:r>
-            <a:r>
-              <a:rPr lang="en-US" sz="1800" dirty="0"/>
-              <a:t>-anima-</a:t>
-            </a:r>
-            <a:r>
-              <a:rPr lang="en-US" sz="1800" dirty="0" err="1"/>
-              <a:t>jws</a:t>
-            </a:r>
-            <a:r>
-              <a:rPr lang="en-US" sz="1800" dirty="0"/>
-              <a:t>-voucher (this draft)</a:t>
+              <a:t>Voucher in JSON-in-JWS	- </a:t>
+            </a:r>
+            <a:r>
+              <a:rPr lang="en-US" sz="1800" noProof="1"/>
+              <a:t>draft-ietf-anima-jws-voucher (this draft)</a:t>
             </a:r>
           </a:p>
           <a:p>
@@ -5370,7 +5429,7 @@
             <a:fld id="{8C792E63-5F21-4F54-A864-D84D9F273FCA}" type="datetimeFigureOut">
               <a:rPr lang="en-US" smtClean="0"/>
               <a:pPr/>
-              <a:t>7/8/2022</a:t>
+              <a:t>7/12/2022</a:t>
             </a:fld>
             <a:endParaRPr lang="en-US" dirty="0"/>
           </a:p>
@@ -5702,7 +5761,7 @@
             <a:fld id="{8C792E63-5F21-4F54-A864-D84D9F273FCA}" type="datetimeFigureOut">
               <a:rPr lang="en-US" smtClean="0"/>
               <a:pPr/>
-              <a:t>7/8/2022</a:t>
+              <a:t>7/12/2022</a:t>
             </a:fld>
             <a:endParaRPr lang="en-US" dirty="0"/>
           </a:p>
@@ -5944,7 +6003,7 @@
         </p:nvSpPr>
         <p:spPr>
           <a:xfrm>
-            <a:off x="6827266" y="5908432"/>
+            <a:off x="6827266" y="4842685"/>
             <a:ext cx="4302369" cy="523220"/>
           </a:xfrm>
           <a:prstGeom prst="rect">
@@ -6103,8 +6162,8 @@
         </p:nvSpPr>
         <p:spPr>
           <a:xfrm>
-            <a:off x="8159232" y="5323437"/>
-            <a:ext cx="3537839" cy="369332"/>
+            <a:off x="6204239" y="5941450"/>
+            <a:ext cx="4137939" cy="553998"/>
           </a:xfrm>
           <a:prstGeom prst="rect">
             <a:avLst/>
@@ -6119,15 +6178,22 @@
           <a:p>
             <a:r>
               <a:rPr lang="en-US" dirty="0"/>
-              <a:t>Added optional „</a:t>
-            </a:r>
-            <a:r>
-              <a:rPr lang="en-US" dirty="0" err="1"/>
+              <a:t>Added optional header parameter „</a:t>
+            </a:r>
+            <a:r>
+              <a:rPr lang="en-US" noProof="1"/>
               <a:t>typ</a:t>
             </a:r>
             <a:r>
               <a:rPr lang="en-US" dirty="0"/>
-              <a:t>“ parameter</a:t>
+              <a:t>“ </a:t>
+            </a:r>
+            <a:br>
+              <a:rPr lang="en-US" dirty="0"/>
+            </a:br>
+            <a:r>
+              <a:rPr lang="en-US" sz="1200" dirty="0"/>
+              <a:t>(register with IANA, see section 6.1.1)</a:t>
             </a:r>
           </a:p>
         </p:txBody>
@@ -6144,13 +6210,14 @@
           <p:cNvCxnSpPr>
             <a:cxnSpLocks/>
             <a:stCxn id="13" idx="1"/>
+            <a:endCxn id="8" idx="6"/>
           </p:cNvCxnSpPr>
           <p:nvPr/>
         </p:nvCxnSpPr>
         <p:spPr>
           <a:xfrm flipH="1" flipV="1">
-            <a:off x="4725909" y="4798337"/>
-            <a:ext cx="3433323" cy="709766"/>
+            <a:off x="4571994" y="4784760"/>
+            <a:ext cx="1632245" cy="1433689"/>
           </a:xfrm>
           <a:prstGeom prst="straightConnector1">
             <a:avLst/>
@@ -6316,7 +6383,7 @@
               <a:t>Added optional header parameter "</a:t>
             </a:r>
             <a:r>
-              <a:rPr lang="en-US" sz="2200" dirty="0" err="1"/>
+              <a:rPr lang="en-US" sz="2200" noProof="1"/>
               <a:t>typ</a:t>
             </a:r>
             <a:r>
@@ -6324,7 +6391,7 @@
               <a:t>": "</a:t>
             </a:r>
             <a:r>
-              <a:rPr lang="en-US" sz="2200" dirty="0" err="1"/>
+              <a:rPr lang="en-US" sz="2200" noProof="1"/>
               <a:t>voucher-jws+json</a:t>
             </a:r>
             <a:r>
@@ -6478,7 +6545,7 @@
             <a:fld id="{8C792E63-5F21-4F54-A864-D84D9F273FCA}" type="datetimeFigureOut">
               <a:rPr lang="en-US" smtClean="0"/>
               <a:pPr/>
-              <a:t>7/8/2022</a:t>
+              <a:t>7/12/2022</a:t>
             </a:fld>
             <a:endParaRPr lang="en-US" dirty="0"/>
           </a:p>
@@ -6695,7 +6762,7 @@
         </p:nvSpPr>
         <p:spPr>
           <a:xfrm>
-            <a:off x="701640" y="1346907"/>
+            <a:off x="701640" y="1927075"/>
             <a:ext cx="10515600" cy="3611206"/>
           </a:xfrm>
         </p:spPr>
@@ -6713,6 +6780,28 @@
             <a:r>
               <a:rPr lang="en-US" sz="2200" dirty="0"/>
               <a:t>Finalize writing of this draft (content should be complete)</a:t>
+            </a:r>
+          </a:p>
+          <a:p>
+            <a:pPr lvl="1">
+              <a:lnSpc>
+                <a:spcPct val="100000"/>
+              </a:lnSpc>
+            </a:pPr>
+            <a:r>
+              <a:rPr lang="en-US" sz="1800" dirty="0"/>
+              <a:t>Alignment in BRSKI design team calls</a:t>
+            </a:r>
+          </a:p>
+          <a:p>
+            <a:pPr lvl="1">
+              <a:lnSpc>
+                <a:spcPct val="100000"/>
+              </a:lnSpc>
+            </a:pPr>
+            <a:r>
+              <a:rPr lang="en-US" sz="1800" dirty="0"/>
+              <a:t>Circulate outcome on the mailing list for further discussion</a:t>
             </a:r>
           </a:p>
           <a:p>
@@ -6731,8 +6820,31 @@
             </a:pPr>
             <a:r>
               <a:rPr lang="en-US" sz="2200" dirty="0"/>
-              <a:t>Alignment in BRSKI design team calls</a:t>
-            </a:r>
+              <a:t>Interop testing with others welcome </a:t>
+            </a:r>
+            <a:r>
+              <a:rPr lang="en-US" sz="2200" dirty="0">
+                <a:sym typeface="Wingdings" panose="05000000000000000000" pitchFamily="2" charset="2"/>
+              </a:rPr>
+              <a:t></a:t>
+            </a:r>
+          </a:p>
+          <a:p>
+            <a:pPr lvl="1">
+              <a:lnSpc>
+                <a:spcPct val="100000"/>
+              </a:lnSpc>
+            </a:pPr>
+            <a:r>
+              <a:rPr lang="en-US" sz="1800" dirty="0">
+                <a:sym typeface="Wingdings" panose="05000000000000000000" pitchFamily="2" charset="2"/>
+              </a:rPr>
+              <a:t>Could happen in combination with BRSKI-PRM interop</a:t>
+            </a:r>
+            <a:br>
+              <a:rPr lang="en-US" sz="1800" dirty="0"/>
+            </a:br>
+            <a:endParaRPr lang="en-US" sz="1800" dirty="0"/>
           </a:p>
           <a:p>
             <a:pPr>
@@ -6750,52 +6862,7 @@
             </a:pPr>
             <a:r>
               <a:rPr lang="en-US" sz="2200" dirty="0"/>
-              <a:t>Circulate outcome on the mailing list for further discussion</a:t>
-            </a:r>
-          </a:p>
-          <a:p>
-            <a:pPr>
-              <a:lnSpc>
-                <a:spcPct val="100000"/>
-              </a:lnSpc>
-            </a:pPr>
-            <a:endParaRPr lang="en-US" sz="2200" dirty="0"/>
-          </a:p>
-          <a:p>
-            <a:pPr>
-              <a:lnSpc>
-                <a:spcPct val="100000"/>
-              </a:lnSpc>
-            </a:pPr>
-            <a:r>
-              <a:rPr lang="en-US" sz="2200" dirty="0"/>
-              <a:t>PoC implementation JWS Voucher and BRSKI-PRM done, </a:t>
-            </a:r>
-            <a:br>
-              <a:rPr lang="en-US" sz="2200" dirty="0"/>
-            </a:br>
-            <a:r>
-              <a:rPr lang="en-US" sz="2200" dirty="0"/>
-              <a:t>interop testing with others welcome</a:t>
-            </a:r>
-          </a:p>
-          <a:p>
-            <a:pPr>
-              <a:lnSpc>
-                <a:spcPct val="100000"/>
-              </a:lnSpc>
-            </a:pPr>
-            <a:endParaRPr lang="en-US" sz="2200" dirty="0"/>
-          </a:p>
-          <a:p>
-            <a:pPr>
-              <a:lnSpc>
-                <a:spcPct val="100000"/>
-              </a:lnSpc>
-            </a:pPr>
-            <a:r>
-              <a:rPr lang="en-US" sz="2200" dirty="0"/>
-              <a:t>WG review appreciated and shepherd</a:t>
+              <a:t>WG review and shepherd appreciated</a:t>
             </a:r>
           </a:p>
           <a:p>
@@ -6935,7 +7002,7 @@
             <a:fld id="{8C792E63-5F21-4F54-A864-D84D9F273FCA}" type="datetimeFigureOut">
               <a:rPr lang="en-US" smtClean="0"/>
               <a:pPr/>
-              <a:t>7/8/2022</a:t>
+              <a:t>7/12/2022</a:t>
             </a:fld>
             <a:endParaRPr lang="en-US" dirty="0"/>
           </a:p>
@@ -7087,8 +7154,8 @@
         </p:nvSpPr>
         <p:spPr>
           <a:xfrm>
-            <a:off x="1680754" y="5860959"/>
-            <a:ext cx="10189818" cy="307777"/>
+            <a:off x="5196314" y="5860959"/>
+            <a:ext cx="6674258" cy="307777"/>
           </a:xfrm>
           <a:prstGeom prst="rect">
             <a:avLst/>
@@ -7112,22 +7179,14 @@
             </a:r>
             <a:r>
               <a:rPr lang="de-DE" sz="1400" dirty="0"/>
-              <a:t> (draft-</a:t>
-            </a:r>
-            <a:r>
-              <a:rPr lang="de-DE" sz="1400" dirty="0" err="1"/>
-              <a:t>ietf</a:t>
-            </a:r>
-            <a:r>
-              <a:rPr lang="de-DE" sz="1400" dirty="0"/>
-              <a:t>-</a:t>
-            </a:r>
-            <a:r>
-              <a:rPr lang="de-DE" sz="1400" dirty="0" err="1"/>
-              <a:t>anima-brski-prm</a:t>
-            </a:r>
-            <a:r>
-              <a:rPr lang="de-DE" sz="1400" dirty="0"/>
+              <a:t> (</a:t>
+            </a:r>
+            <a:r>
+              <a:rPr lang="en-US" sz="1400" noProof="1"/>
+              <a:t>draft-ietf-anima-brski-prm</a:t>
+            </a:r>
+            <a:r>
+              <a:rPr lang="en-US" sz="1400" dirty="0"/>
               <a:t>)</a:t>
             </a:r>
           </a:p>
@@ -7181,8 +7240,8 @@
         </p:nvSpPr>
         <p:spPr>
           <a:xfrm>
-            <a:off x="838200" y="539300"/>
-            <a:ext cx="10515600" cy="1325563"/>
+            <a:off x="838200" y="905059"/>
+            <a:ext cx="10515600" cy="4852507"/>
           </a:xfrm>
         </p:spPr>
         <p:txBody>
@@ -7191,105 +7250,34 @@
           </a:bodyPr>
           <a:lstStyle/>
           <a:p>
+            <a:pPr algn="ctr"/>
             <a:r>
               <a:rPr lang="en-US" sz="3600" b="1" dirty="0"/>
-              <a:t>Abbreviations</a:t>
-            </a:r>
-          </a:p>
-        </p:txBody>
-      </p:sp>
-      <p:sp>
-        <p:nvSpPr>
-          <p:cNvPr id="3" name="Content Placeholder 2">
-            <a:extLst>
-              <a:ext uri="{FF2B5EF4-FFF2-40B4-BE49-F238E27FC236}">
-                <a16:creationId xmlns:a16="http://schemas.microsoft.com/office/drawing/2014/main" id="{A9776AB7-EF6B-4831-BA5E-A2298E1B08F8}"/>
-              </a:ext>
-            </a:extLst>
-          </p:cNvPr>
-          <p:cNvSpPr>
-            <a:spLocks noGrp="1"/>
-          </p:cNvSpPr>
-          <p:nvPr>
-            <p:ph idx="1"/>
-          </p:nvPr>
-        </p:nvSpPr>
-        <p:spPr>
-          <a:xfrm>
-            <a:off x="838200" y="2160665"/>
-            <a:ext cx="10515600" cy="3042466"/>
-          </a:xfrm>
-        </p:spPr>
-        <p:txBody>
-          <a:bodyPr>
-            <a:noAutofit/>
-          </a:bodyPr>
-          <a:lstStyle/>
-          <a:p>
-            <a:pPr>
-              <a:lnSpc>
-                <a:spcPct val="100000"/>
-              </a:lnSpc>
-            </a:pPr>
-            <a:r>
-              <a:rPr lang="en-US" sz="2200" dirty="0"/>
-              <a:t>JWS - JSON Web Signature</a:t>
-            </a:r>
-          </a:p>
-          <a:p>
-            <a:pPr>
-              <a:lnSpc>
-                <a:spcPct val="100000"/>
-              </a:lnSpc>
-            </a:pPr>
-            <a:endParaRPr lang="en-US" sz="2200" dirty="0"/>
-          </a:p>
-          <a:p>
-            <a:pPr>
-              <a:lnSpc>
-                <a:spcPct val="100000"/>
-              </a:lnSpc>
-            </a:pPr>
-            <a:r>
-              <a:rPr lang="en-US" sz="2200" dirty="0"/>
-              <a:t>PVR - Pledge voucher-request</a:t>
-            </a:r>
-          </a:p>
-          <a:p>
-            <a:pPr>
-              <a:lnSpc>
-                <a:spcPct val="100000"/>
-              </a:lnSpc>
-            </a:pPr>
-            <a:endParaRPr lang="en-US" sz="2200" dirty="0"/>
-          </a:p>
-          <a:p>
-            <a:pPr>
-              <a:lnSpc>
-                <a:spcPct val="100000"/>
-              </a:lnSpc>
-            </a:pPr>
-            <a:r>
-              <a:rPr lang="en-US" sz="2200" dirty="0"/>
-              <a:t>RVR  - Registrar voucher-request</a:t>
-            </a:r>
-          </a:p>
-          <a:p>
-            <a:pPr lvl="1">
-              <a:lnSpc>
-                <a:spcPct val="100000"/>
-              </a:lnSpc>
-            </a:pPr>
-            <a:endParaRPr lang="en-US" sz="1800" dirty="0"/>
-          </a:p>
-          <a:p>
-            <a:pPr marL="0" indent="0">
-              <a:lnSpc>
-                <a:spcPct val="100000"/>
-              </a:lnSpc>
-              <a:buNone/>
-            </a:pPr>
-            <a:endParaRPr lang="en-US" sz="2200" dirty="0"/>
+              <a:t>Time for</a:t>
+            </a:r>
+            <a:br>
+              <a:rPr lang="en-US" sz="3600" b="1" dirty="0"/>
+            </a:br>
+            <a:br>
+              <a:rPr lang="en-US" sz="3600" b="1" dirty="0"/>
+            </a:br>
+            <a:r>
+              <a:rPr lang="en-US" sz="5400" b="1" dirty="0"/>
+              <a:t>Discussion!    Questions?    Feedback!</a:t>
+            </a:r>
+            <a:br>
+              <a:rPr lang="en-US" sz="5400" b="1" dirty="0"/>
+            </a:br>
+            <a:br>
+              <a:rPr lang="en-US" sz="5400" b="1" dirty="0"/>
+            </a:br>
+            <a:br>
+              <a:rPr lang="en-US" sz="5400" b="1" dirty="0"/>
+            </a:br>
+            <a:r>
+              <a:rPr lang="en-US" sz="5400" b="1" dirty="0"/>
+              <a:t>Thanks for your attention</a:t>
+            </a:r>
           </a:p>
         </p:txBody>
       </p:sp>
@@ -7419,7 +7407,7 @@
             <a:fld id="{8C792E63-5F21-4F54-A864-D84D9F273FCA}" type="datetimeFigureOut">
               <a:rPr lang="en-US" smtClean="0"/>
               <a:pPr/>
-              <a:t>7/8/2022</a:t>
+              <a:t>7/12/2022</a:t>
             </a:fld>
             <a:endParaRPr lang="en-US" dirty="0"/>
           </a:p>
@@ -7561,6 +7549,438 @@
     <p:extLst>
       <p:ext uri="{BB962C8B-B14F-4D97-AF65-F5344CB8AC3E}">
         <p14:creationId xmlns:p14="http://schemas.microsoft.com/office/powerpoint/2010/main" val="1031465251"/>
+      </p:ext>
+    </p:extLst>
+  </p:cSld>
+  <p:clrMapOvr>
+    <a:masterClrMapping/>
+  </p:clrMapOvr>
+</p:sld>
+</file>
+
+<file path=ppt/slides/slide8.xml><?xml version="1.0" encoding="utf-8"?>
+<p:sld xmlns:a="http://schemas.openxmlformats.org/drawingml/2006/main" xmlns:r="http://schemas.openxmlformats.org/officeDocument/2006/relationships" xmlns:p="http://schemas.openxmlformats.org/presentationml/2006/main">
+  <p:cSld>
+    <p:spTree>
+      <p:nvGrpSpPr>
+        <p:cNvPr id="1" name=""/>
+        <p:cNvGrpSpPr/>
+        <p:nvPr/>
+      </p:nvGrpSpPr>
+      <p:grpSpPr>
+        <a:xfrm>
+          <a:off x="0" y="0"/>
+          <a:ext cx="0" cy="0"/>
+          <a:chOff x="0" y="0"/>
+          <a:chExt cx="0" cy="0"/>
+        </a:xfrm>
+      </p:grpSpPr>
+      <p:sp>
+        <p:nvSpPr>
+          <p:cNvPr id="2" name="Title 1">
+            <a:extLst>
+              <a:ext uri="{FF2B5EF4-FFF2-40B4-BE49-F238E27FC236}">
+                <a16:creationId xmlns:a16="http://schemas.microsoft.com/office/drawing/2014/main" id="{67612D3D-95B0-4F74-BDB2-BCE058A01C12}"/>
+              </a:ext>
+            </a:extLst>
+          </p:cNvPr>
+          <p:cNvSpPr>
+            <a:spLocks noGrp="1"/>
+          </p:cNvSpPr>
+          <p:nvPr>
+            <p:ph type="title"/>
+          </p:nvPr>
+        </p:nvSpPr>
+        <p:spPr>
+          <a:xfrm>
+            <a:off x="838200" y="539300"/>
+            <a:ext cx="10515600" cy="1325563"/>
+          </a:xfrm>
+        </p:spPr>
+        <p:txBody>
+          <a:bodyPr>
+            <a:noAutofit/>
+          </a:bodyPr>
+          <a:lstStyle/>
+          <a:p>
+            <a:r>
+              <a:rPr lang="en-US" sz="3600" b="1" dirty="0"/>
+              <a:t>Abbreviations, References</a:t>
+            </a:r>
+          </a:p>
+        </p:txBody>
+      </p:sp>
+      <p:sp>
+        <p:nvSpPr>
+          <p:cNvPr id="3" name="Content Placeholder 2">
+            <a:extLst>
+              <a:ext uri="{FF2B5EF4-FFF2-40B4-BE49-F238E27FC236}">
+                <a16:creationId xmlns:a16="http://schemas.microsoft.com/office/drawing/2014/main" id="{A9776AB7-EF6B-4831-BA5E-A2298E1B08F8}"/>
+              </a:ext>
+            </a:extLst>
+          </p:cNvPr>
+          <p:cNvSpPr>
+            <a:spLocks noGrp="1"/>
+          </p:cNvSpPr>
+          <p:nvPr>
+            <p:ph idx="1"/>
+          </p:nvPr>
+        </p:nvSpPr>
+        <p:spPr>
+          <a:xfrm>
+            <a:off x="838199" y="2160665"/>
+            <a:ext cx="11023775" cy="3042466"/>
+          </a:xfrm>
+        </p:spPr>
+        <p:txBody>
+          <a:bodyPr>
+            <a:noAutofit/>
+          </a:bodyPr>
+          <a:lstStyle/>
+          <a:p>
+            <a:r>
+              <a:rPr lang="en-US" sz="2000" dirty="0"/>
+              <a:t>BRSKI				Bootstrapping of Remote Secure Key Infrastructure (RFC 8995)</a:t>
+            </a:r>
+          </a:p>
+          <a:p>
+            <a:r>
+              <a:rPr lang="en-US" sz="2000" dirty="0"/>
+              <a:t>BRSKI-PRM			BRSKI with Pledge in Responder Mode (</a:t>
+            </a:r>
+            <a:r>
+              <a:rPr lang="en-US" sz="2000" noProof="1"/>
+              <a:t>draft-ietf-anima-brski-prm</a:t>
+            </a:r>
+            <a:r>
+              <a:rPr lang="en-US" sz="2000" dirty="0"/>
+              <a:t>)</a:t>
+            </a:r>
+          </a:p>
+          <a:p>
+            <a:r>
+              <a:rPr lang="en-US" sz="2000" dirty="0"/>
+              <a:t>CMS				Cryptographic Message Syntax (RFC 5652)</a:t>
+            </a:r>
+          </a:p>
+          <a:p>
+            <a:r>
+              <a:rPr lang="en-US" sz="2000" dirty="0"/>
+              <a:t>JWS				JSON Web Signature (RFC 7515)</a:t>
+            </a:r>
+          </a:p>
+          <a:p>
+            <a:r>
+              <a:rPr lang="en-US" sz="2000" dirty="0"/>
+              <a:t>Voucher (JWS-signed JSON) 	JWS signed Voucher Artifacts for Bootstrapping Protocols 					(this draft, </a:t>
+            </a:r>
+            <a:r>
+              <a:rPr lang="en-US" sz="2000" noProof="1"/>
+              <a:t>draft-ietf-anima-jws-voucher</a:t>
+            </a:r>
+            <a:r>
+              <a:rPr lang="en-US" sz="2000" dirty="0"/>
+              <a:t>)</a:t>
+            </a:r>
+          </a:p>
+          <a:p>
+            <a:r>
+              <a:rPr lang="en-US" sz="2000" dirty="0"/>
+              <a:t>Voucher (CMS-signed JSON) 	A Voucher Artifact for Bootstrapping Protocols (RFC 8366)</a:t>
+            </a:r>
+          </a:p>
+          <a:p>
+            <a:pPr>
+              <a:lnSpc>
+                <a:spcPct val="100000"/>
+              </a:lnSpc>
+            </a:pPr>
+            <a:r>
+              <a:rPr lang="en-US" sz="2000" dirty="0"/>
+              <a:t>PVR				Pledge-voucher-request</a:t>
+            </a:r>
+          </a:p>
+          <a:p>
+            <a:pPr>
+              <a:lnSpc>
+                <a:spcPct val="100000"/>
+              </a:lnSpc>
+            </a:pPr>
+            <a:r>
+              <a:rPr lang="en-US" sz="2000" dirty="0"/>
+              <a:t>RVR				Registrar-voucher-request</a:t>
+            </a:r>
+          </a:p>
+        </p:txBody>
+      </p:sp>
+      <p:sp>
+        <p:nvSpPr>
+          <p:cNvPr id="4" name="Date Placeholder 3">
+            <a:extLst>
+              <a:ext uri="{FF2B5EF4-FFF2-40B4-BE49-F238E27FC236}">
+                <a16:creationId xmlns:a16="http://schemas.microsoft.com/office/drawing/2014/main" id="{603A4F89-D37F-47CD-A5DD-8B1F7476D4B1}"/>
+              </a:ext>
+            </a:extLst>
+          </p:cNvPr>
+          <p:cNvSpPr txBox="1">
+            <a:spLocks/>
+          </p:cNvSpPr>
+          <p:nvPr/>
+        </p:nvSpPr>
+        <p:spPr>
+          <a:xfrm>
+            <a:off x="838200" y="6356350"/>
+            <a:ext cx="2743200" cy="365125"/>
+          </a:xfrm>
+          <a:prstGeom prst="rect">
+            <a:avLst/>
+          </a:prstGeom>
+        </p:spPr>
+        <p:txBody>
+          <a:bodyPr vert="horz" lIns="91440" tIns="45720" rIns="91440" bIns="45720" rtlCol="0" anchor="ctr"/>
+          <a:lstStyle>
+            <a:defPPr>
+              <a:defRPr lang="de-DE"/>
+            </a:defPPr>
+            <a:lvl1pPr marL="0" algn="l" defTabSz="914400" rtl="0" eaLnBrk="1" latinLnBrk="0" hangingPunct="1">
+              <a:defRPr sz="1200" kern="1200">
+                <a:solidFill>
+                  <a:schemeClr val="tx1">
+                    <a:tint val="75000"/>
+                  </a:schemeClr>
+                </a:solidFill>
+                <a:latin typeface="+mn-lt"/>
+                <a:ea typeface="+mn-ea"/>
+                <a:cs typeface="+mn-cs"/>
+              </a:defRPr>
+            </a:lvl1pPr>
+            <a:lvl2pPr marL="457200" algn="l" defTabSz="914400" rtl="0" eaLnBrk="1" latinLnBrk="0" hangingPunct="1">
+              <a:defRPr sz="1800" kern="1200">
+                <a:solidFill>
+                  <a:schemeClr val="tx1"/>
+                </a:solidFill>
+                <a:latin typeface="+mn-lt"/>
+                <a:ea typeface="+mn-ea"/>
+                <a:cs typeface="+mn-cs"/>
+              </a:defRPr>
+            </a:lvl2pPr>
+            <a:lvl3pPr marL="914400" algn="l" defTabSz="914400" rtl="0" eaLnBrk="1" latinLnBrk="0" hangingPunct="1">
+              <a:defRPr sz="1800" kern="1200">
+                <a:solidFill>
+                  <a:schemeClr val="tx1"/>
+                </a:solidFill>
+                <a:latin typeface="+mn-lt"/>
+                <a:ea typeface="+mn-ea"/>
+                <a:cs typeface="+mn-cs"/>
+              </a:defRPr>
+            </a:lvl3pPr>
+            <a:lvl4pPr marL="1371600" algn="l" defTabSz="914400" rtl="0" eaLnBrk="1" latinLnBrk="0" hangingPunct="1">
+              <a:defRPr sz="1800" kern="1200">
+                <a:solidFill>
+                  <a:schemeClr val="tx1"/>
+                </a:solidFill>
+                <a:latin typeface="+mn-lt"/>
+                <a:ea typeface="+mn-ea"/>
+                <a:cs typeface="+mn-cs"/>
+              </a:defRPr>
+            </a:lvl4pPr>
+            <a:lvl5pPr marL="1828800" algn="l" defTabSz="914400" rtl="0" eaLnBrk="1" latinLnBrk="0" hangingPunct="1">
+              <a:defRPr sz="1800" kern="1200">
+                <a:solidFill>
+                  <a:schemeClr val="tx1"/>
+                </a:solidFill>
+                <a:latin typeface="+mn-lt"/>
+                <a:ea typeface="+mn-ea"/>
+                <a:cs typeface="+mn-cs"/>
+              </a:defRPr>
+            </a:lvl5pPr>
+            <a:lvl6pPr marL="2286000" algn="l" defTabSz="914400" rtl="0" eaLnBrk="1" latinLnBrk="0" hangingPunct="1">
+              <a:defRPr sz="1800" kern="1200">
+                <a:solidFill>
+                  <a:schemeClr val="tx1"/>
+                </a:solidFill>
+                <a:latin typeface="+mn-lt"/>
+                <a:ea typeface="+mn-ea"/>
+                <a:cs typeface="+mn-cs"/>
+              </a:defRPr>
+            </a:lvl6pPr>
+            <a:lvl7pPr marL="2743200" algn="l" defTabSz="914400" rtl="0" eaLnBrk="1" latinLnBrk="0" hangingPunct="1">
+              <a:defRPr sz="1800" kern="1200">
+                <a:solidFill>
+                  <a:schemeClr val="tx1"/>
+                </a:solidFill>
+                <a:latin typeface="+mn-lt"/>
+                <a:ea typeface="+mn-ea"/>
+                <a:cs typeface="+mn-cs"/>
+              </a:defRPr>
+            </a:lvl7pPr>
+            <a:lvl8pPr marL="3200400" algn="l" defTabSz="914400" rtl="0" eaLnBrk="1" latinLnBrk="0" hangingPunct="1">
+              <a:defRPr sz="1800" kern="1200">
+                <a:solidFill>
+                  <a:schemeClr val="tx1"/>
+                </a:solidFill>
+                <a:latin typeface="+mn-lt"/>
+                <a:ea typeface="+mn-ea"/>
+                <a:cs typeface="+mn-cs"/>
+              </a:defRPr>
+            </a:lvl8pPr>
+            <a:lvl9pPr marL="3657600" algn="l" defTabSz="914400" rtl="0" eaLnBrk="1" latinLnBrk="0" hangingPunct="1">
+              <a:defRPr sz="1800" kern="1200">
+                <a:solidFill>
+                  <a:schemeClr val="tx1"/>
+                </a:solidFill>
+                <a:latin typeface="+mn-lt"/>
+                <a:ea typeface="+mn-ea"/>
+                <a:cs typeface="+mn-cs"/>
+              </a:defRPr>
+            </a:lvl9pPr>
+          </a:lstStyle>
+          <a:p>
+            <a:fld id="{8C792E63-5F21-4F54-A864-D84D9F273FCA}" type="datetimeFigureOut">
+              <a:rPr lang="en-US" smtClean="0"/>
+              <a:pPr/>
+              <a:t>7/12/2022</a:t>
+            </a:fld>
+            <a:endParaRPr lang="en-US" dirty="0"/>
+          </a:p>
+        </p:txBody>
+      </p:sp>
+      <p:sp>
+        <p:nvSpPr>
+          <p:cNvPr id="5" name="Slide Number Placeholder 5">
+            <a:extLst>
+              <a:ext uri="{FF2B5EF4-FFF2-40B4-BE49-F238E27FC236}">
+                <a16:creationId xmlns:a16="http://schemas.microsoft.com/office/drawing/2014/main" id="{EA009C1A-0CD0-4840-856B-B85603FEF6D0}"/>
+              </a:ext>
+            </a:extLst>
+          </p:cNvPr>
+          <p:cNvSpPr txBox="1">
+            <a:spLocks/>
+          </p:cNvSpPr>
+          <p:nvPr/>
+        </p:nvSpPr>
+        <p:spPr>
+          <a:xfrm>
+            <a:off x="8610600" y="6356350"/>
+            <a:ext cx="2743200" cy="365125"/>
+          </a:xfrm>
+          <a:prstGeom prst="rect">
+            <a:avLst/>
+          </a:prstGeom>
+        </p:spPr>
+        <p:txBody>
+          <a:bodyPr vert="horz" lIns="91440" tIns="45720" rIns="91440" bIns="45720" rtlCol="0" anchor="ctr"/>
+          <a:lstStyle>
+            <a:defPPr>
+              <a:defRPr lang="de-DE"/>
+            </a:defPPr>
+            <a:lvl1pPr marL="0" algn="r" defTabSz="914400" rtl="0" eaLnBrk="1" latinLnBrk="0" hangingPunct="1">
+              <a:defRPr sz="1200" kern="1200">
+                <a:solidFill>
+                  <a:schemeClr val="tx1">
+                    <a:tint val="75000"/>
+                  </a:schemeClr>
+                </a:solidFill>
+                <a:latin typeface="+mn-lt"/>
+                <a:ea typeface="+mn-ea"/>
+                <a:cs typeface="+mn-cs"/>
+              </a:defRPr>
+            </a:lvl1pPr>
+            <a:lvl2pPr marL="457200" algn="l" defTabSz="914400" rtl="0" eaLnBrk="1" latinLnBrk="0" hangingPunct="1">
+              <a:defRPr sz="1800" kern="1200">
+                <a:solidFill>
+                  <a:schemeClr val="tx1"/>
+                </a:solidFill>
+                <a:latin typeface="+mn-lt"/>
+                <a:ea typeface="+mn-ea"/>
+                <a:cs typeface="+mn-cs"/>
+              </a:defRPr>
+            </a:lvl2pPr>
+            <a:lvl3pPr marL="914400" algn="l" defTabSz="914400" rtl="0" eaLnBrk="1" latinLnBrk="0" hangingPunct="1">
+              <a:defRPr sz="1800" kern="1200">
+                <a:solidFill>
+                  <a:schemeClr val="tx1"/>
+                </a:solidFill>
+                <a:latin typeface="+mn-lt"/>
+                <a:ea typeface="+mn-ea"/>
+                <a:cs typeface="+mn-cs"/>
+              </a:defRPr>
+            </a:lvl3pPr>
+            <a:lvl4pPr marL="1371600" algn="l" defTabSz="914400" rtl="0" eaLnBrk="1" latinLnBrk="0" hangingPunct="1">
+              <a:defRPr sz="1800" kern="1200">
+                <a:solidFill>
+                  <a:schemeClr val="tx1"/>
+                </a:solidFill>
+                <a:latin typeface="+mn-lt"/>
+                <a:ea typeface="+mn-ea"/>
+                <a:cs typeface="+mn-cs"/>
+              </a:defRPr>
+            </a:lvl4pPr>
+            <a:lvl5pPr marL="1828800" algn="l" defTabSz="914400" rtl="0" eaLnBrk="1" latinLnBrk="0" hangingPunct="1">
+              <a:defRPr sz="1800" kern="1200">
+                <a:solidFill>
+                  <a:schemeClr val="tx1"/>
+                </a:solidFill>
+                <a:latin typeface="+mn-lt"/>
+                <a:ea typeface="+mn-ea"/>
+                <a:cs typeface="+mn-cs"/>
+              </a:defRPr>
+            </a:lvl5pPr>
+            <a:lvl6pPr marL="2286000" algn="l" defTabSz="914400" rtl="0" eaLnBrk="1" latinLnBrk="0" hangingPunct="1">
+              <a:defRPr sz="1800" kern="1200">
+                <a:solidFill>
+                  <a:schemeClr val="tx1"/>
+                </a:solidFill>
+                <a:latin typeface="+mn-lt"/>
+                <a:ea typeface="+mn-ea"/>
+                <a:cs typeface="+mn-cs"/>
+              </a:defRPr>
+            </a:lvl6pPr>
+            <a:lvl7pPr marL="2743200" algn="l" defTabSz="914400" rtl="0" eaLnBrk="1" latinLnBrk="0" hangingPunct="1">
+              <a:defRPr sz="1800" kern="1200">
+                <a:solidFill>
+                  <a:schemeClr val="tx1"/>
+                </a:solidFill>
+                <a:latin typeface="+mn-lt"/>
+                <a:ea typeface="+mn-ea"/>
+                <a:cs typeface="+mn-cs"/>
+              </a:defRPr>
+            </a:lvl7pPr>
+            <a:lvl8pPr marL="3200400" algn="l" defTabSz="914400" rtl="0" eaLnBrk="1" latinLnBrk="0" hangingPunct="1">
+              <a:defRPr sz="1800" kern="1200">
+                <a:solidFill>
+                  <a:schemeClr val="tx1"/>
+                </a:solidFill>
+                <a:latin typeface="+mn-lt"/>
+                <a:ea typeface="+mn-ea"/>
+                <a:cs typeface="+mn-cs"/>
+              </a:defRPr>
+            </a:lvl8pPr>
+            <a:lvl9pPr marL="3657600" algn="l" defTabSz="914400" rtl="0" eaLnBrk="1" latinLnBrk="0" hangingPunct="1">
+              <a:defRPr sz="1800" kern="1200">
+                <a:solidFill>
+                  <a:schemeClr val="tx1"/>
+                </a:solidFill>
+                <a:latin typeface="+mn-lt"/>
+                <a:ea typeface="+mn-ea"/>
+                <a:cs typeface="+mn-cs"/>
+              </a:defRPr>
+            </a:lvl9pPr>
+          </a:lstStyle>
+          <a:p>
+            <a:fld id="{104F53CC-0028-4916-8B93-0EBFFB2C7AAD}" type="slidenum">
+              <a:rPr lang="en-US" smtClean="0"/>
+              <a:pPr/>
+              <a:t>8</a:t>
+            </a:fld>
+            <a:endParaRPr lang="en-US" dirty="0"/>
+          </a:p>
+        </p:txBody>
+      </p:sp>
+    </p:spTree>
+    <p:extLst>
+      <p:ext uri="{BB962C8B-B14F-4D97-AF65-F5344CB8AC3E}">
+        <p14:creationId xmlns:p14="http://schemas.microsoft.com/office/powerpoint/2010/main" val="1310096588"/>
       </p:ext>
     </p:extLst>
   </p:cSld>

</xml_diff>